<commit_message>
Post build copy binaries to the same directory
</commit_message>
<xml_diff>
--- a/DemoReadme.pptx
+++ b/DemoReadme.pptx
@@ -111,6 +111,22 @@
       </a:defRPr>
     </a:lvl9pPr>
   </p:defaultTextStyle>
+  <p:extLst>
+    <p:ext uri="{EFAFB233-063F-42B5-8137-9DF3F51BA10A}">
+      <p15:sldGuideLst xmlns:p15="http://schemas.microsoft.com/office/powerpoint/2012/main">
+        <p15:guide id="1" orient="horz" pos="2160">
+          <p15:clr>
+            <a:srgbClr val="A4A3A4"/>
+          </p15:clr>
+        </p15:guide>
+        <p15:guide id="2" pos="2880">
+          <p15:clr>
+            <a:srgbClr val="A4A3A4"/>
+          </p15:clr>
+        </p15:guide>
+      </p15:sldGuideLst>
+    </p:ext>
+  </p:extLst>
 </p:presentation>
 </file>
 
@@ -296,7 +312,7 @@
             <a:fld id="{1D8BD707-D9CF-40AE-B4C6-C98DA3205C09}" type="datetimeFigureOut">
               <a:rPr lang="en-US" smtClean="0"/>
               <a:pPr/>
-              <a:t>11/8/2011</a:t>
+              <a:t>1/8/2016</a:t>
             </a:fld>
             <a:endParaRPr lang="en-US"/>
           </a:p>
@@ -463,7 +479,7 @@
             <a:fld id="{1D8BD707-D9CF-40AE-B4C6-C98DA3205C09}" type="datetimeFigureOut">
               <a:rPr lang="en-US" smtClean="0"/>
               <a:pPr/>
-              <a:t>11/8/2011</a:t>
+              <a:t>1/8/2016</a:t>
             </a:fld>
             <a:endParaRPr lang="en-US"/>
           </a:p>
@@ -640,7 +656,7 @@
             <a:fld id="{1D8BD707-D9CF-40AE-B4C6-C98DA3205C09}" type="datetimeFigureOut">
               <a:rPr lang="en-US" smtClean="0"/>
               <a:pPr/>
-              <a:t>11/8/2011</a:t>
+              <a:t>1/8/2016</a:t>
             </a:fld>
             <a:endParaRPr lang="en-US"/>
           </a:p>
@@ -807,7 +823,7 @@
             <a:fld id="{1D8BD707-D9CF-40AE-B4C6-C98DA3205C09}" type="datetimeFigureOut">
               <a:rPr lang="en-US" smtClean="0"/>
               <a:pPr/>
-              <a:t>11/8/2011</a:t>
+              <a:t>1/8/2016</a:t>
             </a:fld>
             <a:endParaRPr lang="en-US"/>
           </a:p>
@@ -1050,7 +1066,7 @@
             <a:fld id="{1D8BD707-D9CF-40AE-B4C6-C98DA3205C09}" type="datetimeFigureOut">
               <a:rPr lang="en-US" smtClean="0"/>
               <a:pPr/>
-              <a:t>11/8/2011</a:t>
+              <a:t>1/8/2016</a:t>
             </a:fld>
             <a:endParaRPr lang="en-US"/>
           </a:p>
@@ -1335,7 +1351,7 @@
             <a:fld id="{1D8BD707-D9CF-40AE-B4C6-C98DA3205C09}" type="datetimeFigureOut">
               <a:rPr lang="en-US" smtClean="0"/>
               <a:pPr/>
-              <a:t>11/8/2011</a:t>
+              <a:t>1/8/2016</a:t>
             </a:fld>
             <a:endParaRPr lang="en-US"/>
           </a:p>
@@ -1754,7 +1770,7 @@
             <a:fld id="{1D8BD707-D9CF-40AE-B4C6-C98DA3205C09}" type="datetimeFigureOut">
               <a:rPr lang="en-US" smtClean="0"/>
               <a:pPr/>
-              <a:t>11/8/2011</a:t>
+              <a:t>1/8/2016</a:t>
             </a:fld>
             <a:endParaRPr lang="en-US"/>
           </a:p>
@@ -1869,7 +1885,7 @@
             <a:fld id="{1D8BD707-D9CF-40AE-B4C6-C98DA3205C09}" type="datetimeFigureOut">
               <a:rPr lang="en-US" smtClean="0"/>
               <a:pPr/>
-              <a:t>11/8/2011</a:t>
+              <a:t>1/8/2016</a:t>
             </a:fld>
             <a:endParaRPr lang="en-US"/>
           </a:p>
@@ -1961,7 +1977,7 @@
             <a:fld id="{1D8BD707-D9CF-40AE-B4C6-C98DA3205C09}" type="datetimeFigureOut">
               <a:rPr lang="en-US" smtClean="0"/>
               <a:pPr/>
-              <a:t>11/8/2011</a:t>
+              <a:t>1/8/2016</a:t>
             </a:fld>
             <a:endParaRPr lang="en-US"/>
           </a:p>
@@ -2235,7 +2251,7 @@
             <a:fld id="{1D8BD707-D9CF-40AE-B4C6-C98DA3205C09}" type="datetimeFigureOut">
               <a:rPr lang="en-US" smtClean="0"/>
               <a:pPr/>
-              <a:t>11/8/2011</a:t>
+              <a:t>1/8/2016</a:t>
             </a:fld>
             <a:endParaRPr lang="en-US"/>
           </a:p>
@@ -2485,7 +2501,7 @@
             <a:fld id="{1D8BD707-D9CF-40AE-B4C6-C98DA3205C09}" type="datetimeFigureOut">
               <a:rPr lang="en-US" smtClean="0"/>
               <a:pPr/>
-              <a:t>11/8/2011</a:t>
+              <a:t>1/8/2016</a:t>
             </a:fld>
             <a:endParaRPr lang="en-US"/>
           </a:p>
@@ -2695,7 +2711,7 @@
             <a:fld id="{1D8BD707-D9CF-40AE-B4C6-C98DA3205C09}" type="datetimeFigureOut">
               <a:rPr lang="en-US" smtClean="0"/>
               <a:pPr/>
-              <a:t>11/8/2011</a:t>
+              <a:t>1/8/2016</a:t>
             </a:fld>
             <a:endParaRPr lang="en-US"/>
           </a:p>
@@ -3203,6 +3219,69 @@
           </a:prstGeom>
         </p:spPr>
       </p:pic>
+      <p:sp>
+        <p:nvSpPr>
+          <p:cNvPr id="5" name="TextBox 4"/>
+          <p:cNvSpPr txBox="1"/>
+          <p:nvPr/>
+        </p:nvSpPr>
+        <p:spPr>
+          <a:xfrm>
+            <a:off x="76200" y="3733800"/>
+            <a:ext cx="3124200" cy="1754326"/>
+          </a:xfrm>
+          <a:prstGeom prst="rect">
+            <a:avLst/>
+          </a:prstGeom>
+          <a:noFill/>
+        </p:spPr>
+        <p:txBody>
+          <a:bodyPr wrap="square" rtlCol="0">
+            <a:spAutoFit/>
+          </a:bodyPr>
+          <a:lstStyle/>
+          <a:p>
+            <a:r>
+              <a:rPr lang="en-US" sz="1200" dirty="0" smtClean="0"/>
+              <a:t>When you build the solution, these files will be automatically copied over to $(</a:t>
+            </a:r>
+            <a:r>
+              <a:rPr lang="en-US" sz="1200" dirty="0" err="1" smtClean="0"/>
+              <a:t>SolutionDir</a:t>
+            </a:r>
+            <a:r>
+              <a:rPr lang="en-US" sz="1200" dirty="0" smtClean="0"/>
+              <a:t>)\Release or $(</a:t>
+            </a:r>
+            <a:r>
+              <a:rPr lang="en-US" sz="1200" dirty="0" err="1" smtClean="0"/>
+              <a:t>SolutionDir</a:t>
+            </a:r>
+            <a:r>
+              <a:rPr lang="en-US" sz="1200" dirty="0" smtClean="0"/>
+              <a:t>)\Debug.</a:t>
+            </a:r>
+          </a:p>
+          <a:p>
+            <a:endParaRPr lang="en-US" sz="1200" dirty="0"/>
+          </a:p>
+          <a:p>
+            <a:r>
+              <a:rPr lang="en-US" sz="1200" dirty="0" smtClean="0"/>
+              <a:t>For debugging, you need to first set the working directory to that local directory so that the dependency </a:t>
+            </a:r>
+            <a:r>
+              <a:rPr lang="en-US" sz="1200" dirty="0" err="1" smtClean="0"/>
+              <a:t>dlls</a:t>
+            </a:r>
+            <a:r>
+              <a:rPr lang="en-US" sz="1200" dirty="0" smtClean="0"/>
+              <a:t> can be found and loaded.</a:t>
+            </a:r>
+            <a:endParaRPr lang="en-US" sz="1200" dirty="0"/>
+          </a:p>
+        </p:txBody>
+      </p:sp>
     </p:spTree>
     <p:extLst>
       <p:ext uri="{BB962C8B-B14F-4D97-AF65-F5344CB8AC3E}">

</xml_diff>